<commit_message>
Added UseCaseImagery for paper
</commit_message>
<xml_diff>
--- a/Images/Helper.pptx
+++ b/Images/Helper.pptx
@@ -6,6 +6,9 @@
   </p:sldMasterIdLst>
   <p:sldIdLst>
     <p:sldId id="256" r:id="rId2"/>
+    <p:sldId id="257" r:id="rId3"/>
+    <p:sldId id="258" r:id="rId4"/>
+    <p:sldId id="259" r:id="rId5"/>
   </p:sldIdLst>
   <p:sldSz cx="12192000" cy="6858000"/>
   <p:notesSz cx="6858000" cy="9144000"/>
@@ -104,6 +107,11 @@
       </a:defRPr>
     </a:lvl9pPr>
   </p:defaultTextStyle>
+  <p:extLst>
+    <p:ext uri="{EFAFB233-063F-42B5-8137-9DF3F51BA10A}">
+      <p15:sldGuideLst xmlns:p15="http://schemas.microsoft.com/office/powerpoint/2012/main"/>
+    </p:ext>
+  </p:extLst>
 </p:presentation>
 </file>
 
@@ -254,7 +262,7 @@
           <a:p>
             <a:fld id="{337BB96B-A957-4895-A1EC-23C49E06A2C8}" type="datetimeFigureOut">
               <a:rPr lang="de-DE" smtClean="0"/>
-              <a:t>08.12.2018</a:t>
+              <a:t>02.01.2019</a:t>
             </a:fld>
             <a:endParaRPr lang="de-DE"/>
           </a:p>
@@ -452,7 +460,7 @@
           <a:p>
             <a:fld id="{337BB96B-A957-4895-A1EC-23C49E06A2C8}" type="datetimeFigureOut">
               <a:rPr lang="de-DE" smtClean="0"/>
-              <a:t>08.12.2018</a:t>
+              <a:t>02.01.2019</a:t>
             </a:fld>
             <a:endParaRPr lang="de-DE"/>
           </a:p>
@@ -660,7 +668,7 @@
           <a:p>
             <a:fld id="{337BB96B-A957-4895-A1EC-23C49E06A2C8}" type="datetimeFigureOut">
               <a:rPr lang="de-DE" smtClean="0"/>
-              <a:t>08.12.2018</a:t>
+              <a:t>02.01.2019</a:t>
             </a:fld>
             <a:endParaRPr lang="de-DE"/>
           </a:p>
@@ -858,7 +866,7 @@
           <a:p>
             <a:fld id="{337BB96B-A957-4895-A1EC-23C49E06A2C8}" type="datetimeFigureOut">
               <a:rPr lang="de-DE" smtClean="0"/>
-              <a:t>08.12.2018</a:t>
+              <a:t>02.01.2019</a:t>
             </a:fld>
             <a:endParaRPr lang="de-DE"/>
           </a:p>
@@ -1133,7 +1141,7 @@
           <a:p>
             <a:fld id="{337BB96B-A957-4895-A1EC-23C49E06A2C8}" type="datetimeFigureOut">
               <a:rPr lang="de-DE" smtClean="0"/>
-              <a:t>08.12.2018</a:t>
+              <a:t>02.01.2019</a:t>
             </a:fld>
             <a:endParaRPr lang="de-DE"/>
           </a:p>
@@ -1398,7 +1406,7 @@
           <a:p>
             <a:fld id="{337BB96B-A957-4895-A1EC-23C49E06A2C8}" type="datetimeFigureOut">
               <a:rPr lang="de-DE" smtClean="0"/>
-              <a:t>08.12.2018</a:t>
+              <a:t>02.01.2019</a:t>
             </a:fld>
             <a:endParaRPr lang="de-DE"/>
           </a:p>
@@ -1810,7 +1818,7 @@
           <a:p>
             <a:fld id="{337BB96B-A957-4895-A1EC-23C49E06A2C8}" type="datetimeFigureOut">
               <a:rPr lang="de-DE" smtClean="0"/>
-              <a:t>08.12.2018</a:t>
+              <a:t>02.01.2019</a:t>
             </a:fld>
             <a:endParaRPr lang="de-DE"/>
           </a:p>
@@ -1951,7 +1959,7 @@
           <a:p>
             <a:fld id="{337BB96B-A957-4895-A1EC-23C49E06A2C8}" type="datetimeFigureOut">
               <a:rPr lang="de-DE" smtClean="0"/>
-              <a:t>08.12.2018</a:t>
+              <a:t>02.01.2019</a:t>
             </a:fld>
             <a:endParaRPr lang="de-DE"/>
           </a:p>
@@ -2064,7 +2072,7 @@
           <a:p>
             <a:fld id="{337BB96B-A957-4895-A1EC-23C49E06A2C8}" type="datetimeFigureOut">
               <a:rPr lang="de-DE" smtClean="0"/>
-              <a:t>08.12.2018</a:t>
+              <a:t>02.01.2019</a:t>
             </a:fld>
             <a:endParaRPr lang="de-DE"/>
           </a:p>
@@ -2375,7 +2383,7 @@
           <a:p>
             <a:fld id="{337BB96B-A957-4895-A1EC-23C49E06A2C8}" type="datetimeFigureOut">
               <a:rPr lang="de-DE" smtClean="0"/>
-              <a:t>08.12.2018</a:t>
+              <a:t>02.01.2019</a:t>
             </a:fld>
             <a:endParaRPr lang="de-DE"/>
           </a:p>
@@ -2663,7 +2671,7 @@
           <a:p>
             <a:fld id="{337BB96B-A957-4895-A1EC-23C49E06A2C8}" type="datetimeFigureOut">
               <a:rPr lang="de-DE" smtClean="0"/>
-              <a:t>08.12.2018</a:t>
+              <a:t>02.01.2019</a:t>
             </a:fld>
             <a:endParaRPr lang="de-DE"/>
           </a:p>
@@ -2904,7 +2912,7 @@
           <a:p>
             <a:fld id="{337BB96B-A957-4895-A1EC-23C49E06A2C8}" type="datetimeFigureOut">
               <a:rPr lang="de-DE" smtClean="0"/>
-              <a:t>08.12.2018</a:t>
+              <a:t>02.01.2019</a:t>
             </a:fld>
             <a:endParaRPr lang="de-DE"/>
           </a:p>
@@ -3999,6 +4007,1190 @@
 </p:sld>
 </file>
 
+<file path=ppt/slides/slide2.xml><?xml version="1.0" encoding="utf-8"?>
+<p:sld xmlns:a="http://schemas.openxmlformats.org/drawingml/2006/main" xmlns:r="http://schemas.openxmlformats.org/officeDocument/2006/relationships" xmlns:p="http://schemas.openxmlformats.org/presentationml/2006/main">
+  <p:cSld>
+    <p:spTree>
+      <p:nvGrpSpPr>
+        <p:cNvPr id="1" name=""/>
+        <p:cNvGrpSpPr/>
+        <p:nvPr/>
+      </p:nvGrpSpPr>
+      <p:grpSpPr>
+        <a:xfrm>
+          <a:off x="0" y="0"/>
+          <a:ext cx="0" cy="0"/>
+          <a:chOff x="0" y="0"/>
+          <a:chExt cx="0" cy="0"/>
+        </a:xfrm>
+      </p:grpSpPr>
+      <p:sp>
+        <p:nvSpPr>
+          <p:cNvPr id="4" name="Rechteck: abgerundete Ecken 3">
+            <a:extLst>
+              <a:ext uri="{FF2B5EF4-FFF2-40B4-BE49-F238E27FC236}">
+                <a16:creationId xmlns:a16="http://schemas.microsoft.com/office/drawing/2014/main" id="{70A33295-6C42-4B12-8F84-AA1EE3C07061}"/>
+              </a:ext>
+            </a:extLst>
+          </p:cNvPr>
+          <p:cNvSpPr/>
+          <p:nvPr/>
+        </p:nvSpPr>
+        <p:spPr>
+          <a:xfrm>
+            <a:off x="1779038" y="1094792"/>
+            <a:ext cx="1704391" cy="634481"/>
+          </a:xfrm>
+          <a:prstGeom prst="roundRect">
+            <a:avLst/>
+          </a:prstGeom>
+        </p:spPr>
+        <p:style>
+          <a:lnRef idx="1">
+            <a:schemeClr val="dk1"/>
+          </a:lnRef>
+          <a:fillRef idx="2">
+            <a:schemeClr val="dk1"/>
+          </a:fillRef>
+          <a:effectRef idx="1">
+            <a:schemeClr val="dk1"/>
+          </a:effectRef>
+          <a:fontRef idx="minor">
+            <a:schemeClr val="dk1"/>
+          </a:fontRef>
+        </p:style>
+        <p:txBody>
+          <a:bodyPr rtlCol="0" anchor="ctr"/>
+          <a:lstStyle/>
+          <a:p>
+            <a:pPr algn="ctr"/>
+            <a:r>
+              <a:rPr lang="de-DE" dirty="0"/>
+              <a:t>Bob-1</a:t>
+            </a:r>
+          </a:p>
+        </p:txBody>
+      </p:sp>
+      <p:sp>
+        <p:nvSpPr>
+          <p:cNvPr id="5" name="Rechteck: abgerundete Ecken 4">
+            <a:extLst>
+              <a:ext uri="{FF2B5EF4-FFF2-40B4-BE49-F238E27FC236}">
+                <a16:creationId xmlns:a16="http://schemas.microsoft.com/office/drawing/2014/main" id="{626A39C0-305C-409F-AB6B-543F77177F21}"/>
+              </a:ext>
+            </a:extLst>
+          </p:cNvPr>
+          <p:cNvSpPr/>
+          <p:nvPr/>
+        </p:nvSpPr>
+        <p:spPr>
+          <a:xfrm>
+            <a:off x="4578220" y="1094791"/>
+            <a:ext cx="1704391" cy="634481"/>
+          </a:xfrm>
+          <a:prstGeom prst="roundRect">
+            <a:avLst/>
+          </a:prstGeom>
+        </p:spPr>
+        <p:style>
+          <a:lnRef idx="1">
+            <a:schemeClr val="dk1"/>
+          </a:lnRef>
+          <a:fillRef idx="2">
+            <a:schemeClr val="dk1"/>
+          </a:fillRef>
+          <a:effectRef idx="1">
+            <a:schemeClr val="dk1"/>
+          </a:effectRef>
+          <a:fontRef idx="minor">
+            <a:schemeClr val="dk1"/>
+          </a:fontRef>
+        </p:style>
+        <p:txBody>
+          <a:bodyPr rtlCol="0" anchor="ctr"/>
+          <a:lstStyle/>
+          <a:p>
+            <a:pPr algn="ctr"/>
+            <a:r>
+              <a:rPr lang="de-DE" dirty="0"/>
+              <a:t>Bob-2</a:t>
+            </a:r>
+          </a:p>
+        </p:txBody>
+      </p:sp>
+      <p:sp>
+        <p:nvSpPr>
+          <p:cNvPr id="6" name="Rechteck: abgerundete Ecken 5">
+            <a:extLst>
+              <a:ext uri="{FF2B5EF4-FFF2-40B4-BE49-F238E27FC236}">
+                <a16:creationId xmlns:a16="http://schemas.microsoft.com/office/drawing/2014/main" id="{2E1A1E50-A6A5-437D-9C65-F6208915DCF7}"/>
+              </a:ext>
+            </a:extLst>
+          </p:cNvPr>
+          <p:cNvSpPr/>
+          <p:nvPr/>
+        </p:nvSpPr>
+        <p:spPr>
+          <a:xfrm>
+            <a:off x="3483429" y="3115647"/>
+            <a:ext cx="1094791" cy="626706"/>
+          </a:xfrm>
+          <a:prstGeom prst="roundRect">
+            <a:avLst/>
+          </a:prstGeom>
+        </p:spPr>
+        <p:style>
+          <a:lnRef idx="1">
+            <a:schemeClr val="accent3"/>
+          </a:lnRef>
+          <a:fillRef idx="2">
+            <a:schemeClr val="accent3"/>
+          </a:fillRef>
+          <a:effectRef idx="1">
+            <a:schemeClr val="accent3"/>
+          </a:effectRef>
+          <a:fontRef idx="minor">
+            <a:schemeClr val="dk1"/>
+          </a:fontRef>
+        </p:style>
+        <p:txBody>
+          <a:bodyPr rtlCol="0" anchor="ctr"/>
+          <a:lstStyle/>
+          <a:p>
+            <a:pPr algn="ctr"/>
+            <a:r>
+              <a:rPr lang="de-DE" dirty="0"/>
+              <a:t>Alice</a:t>
+            </a:r>
+          </a:p>
+        </p:txBody>
+      </p:sp>
+      <p:sp>
+        <p:nvSpPr>
+          <p:cNvPr id="7" name="Rechteck 6">
+            <a:extLst>
+              <a:ext uri="{FF2B5EF4-FFF2-40B4-BE49-F238E27FC236}">
+                <a16:creationId xmlns:a16="http://schemas.microsoft.com/office/drawing/2014/main" id="{EAB340F1-4E8E-4C30-9842-D369BA6F7B8D}"/>
+              </a:ext>
+            </a:extLst>
+          </p:cNvPr>
+          <p:cNvSpPr/>
+          <p:nvPr/>
+        </p:nvSpPr>
+        <p:spPr>
+          <a:xfrm>
+            <a:off x="2086947" y="1729273"/>
+            <a:ext cx="1088571" cy="379444"/>
+          </a:xfrm>
+          <a:prstGeom prst="rect">
+            <a:avLst/>
+          </a:prstGeom>
+          <a:solidFill>
+            <a:schemeClr val="bg2">
+              <a:lumMod val="75000"/>
+            </a:schemeClr>
+          </a:solidFill>
+          <a:ln>
+            <a:solidFill>
+              <a:schemeClr val="tx1"/>
+            </a:solidFill>
+          </a:ln>
+        </p:spPr>
+        <p:style>
+          <a:lnRef idx="2">
+            <a:schemeClr val="accent1">
+              <a:shade val="50000"/>
+            </a:schemeClr>
+          </a:lnRef>
+          <a:fillRef idx="1">
+            <a:schemeClr val="accent1"/>
+          </a:fillRef>
+          <a:effectRef idx="0">
+            <a:schemeClr val="accent1"/>
+          </a:effectRef>
+          <a:fontRef idx="minor">
+            <a:schemeClr val="lt1"/>
+          </a:fontRef>
+        </p:style>
+        <p:txBody>
+          <a:bodyPr rtlCol="0" anchor="ctr"/>
+          <a:lstStyle/>
+          <a:p>
+            <a:pPr algn="ctr"/>
+            <a:r>
+              <a:rPr lang="de-DE" dirty="0"/>
+              <a:t>Login</a:t>
+            </a:r>
+          </a:p>
+        </p:txBody>
+      </p:sp>
+      <p:cxnSp>
+        <p:nvCxnSpPr>
+          <p:cNvPr id="9" name="Verbinder: gewinkelt 8">
+            <a:extLst>
+              <a:ext uri="{FF2B5EF4-FFF2-40B4-BE49-F238E27FC236}">
+                <a16:creationId xmlns:a16="http://schemas.microsoft.com/office/drawing/2014/main" id="{6C57963A-2A70-4D84-BEDB-DE4E12320A48}"/>
+              </a:ext>
+            </a:extLst>
+          </p:cNvPr>
+          <p:cNvCxnSpPr>
+            <a:cxnSpLocks/>
+            <a:stCxn id="6" idx="1"/>
+            <a:endCxn id="7" idx="2"/>
+          </p:cNvCxnSpPr>
+          <p:nvPr/>
+        </p:nvCxnSpPr>
+        <p:spPr>
+          <a:xfrm rot="10800000">
+            <a:off x="2631233" y="2108718"/>
+            <a:ext cx="852196" cy="1320283"/>
+          </a:xfrm>
+          <a:prstGeom prst="bentConnector2">
+            <a:avLst/>
+          </a:prstGeom>
+          <a:ln>
+            <a:tailEnd type="triangle"/>
+          </a:ln>
+        </p:spPr>
+        <p:style>
+          <a:lnRef idx="1">
+            <a:schemeClr val="dk1"/>
+          </a:lnRef>
+          <a:fillRef idx="0">
+            <a:schemeClr val="dk1"/>
+          </a:fillRef>
+          <a:effectRef idx="0">
+            <a:schemeClr val="dk1"/>
+          </a:effectRef>
+          <a:fontRef idx="minor">
+            <a:schemeClr val="tx1"/>
+          </a:fontRef>
+        </p:style>
+      </p:cxnSp>
+      <p:sp>
+        <p:nvSpPr>
+          <p:cNvPr id="12" name="Textfeld 11">
+            <a:extLst>
+              <a:ext uri="{FF2B5EF4-FFF2-40B4-BE49-F238E27FC236}">
+                <a16:creationId xmlns:a16="http://schemas.microsoft.com/office/drawing/2014/main" id="{B1E0ACF6-91DA-4AA1-9AED-DF1789218066}"/>
+              </a:ext>
+            </a:extLst>
+          </p:cNvPr>
+          <p:cNvSpPr txBox="1"/>
+          <p:nvPr/>
+        </p:nvSpPr>
+        <p:spPr>
+          <a:xfrm>
+            <a:off x="2631232" y="2520758"/>
+            <a:ext cx="1244081" cy="430887"/>
+          </a:xfrm>
+          <a:prstGeom prst="rect">
+            <a:avLst/>
+          </a:prstGeom>
+          <a:noFill/>
+        </p:spPr>
+        <p:txBody>
+          <a:bodyPr wrap="square" rtlCol="0">
+            <a:spAutoFit/>
+          </a:bodyPr>
+          <a:lstStyle/>
+          <a:p>
+            <a:r>
+              <a:rPr lang="de-DE" sz="1100" dirty="0"/>
+              <a:t>Login &amp; Creating Commitment</a:t>
+            </a:r>
+            <a:endParaRPr lang="de-DE" dirty="0"/>
+          </a:p>
+        </p:txBody>
+      </p:sp>
+      <p:pic>
+        <p:nvPicPr>
+          <p:cNvPr id="14" name="Grafik 13">
+            <a:extLst>
+              <a:ext uri="{FF2B5EF4-FFF2-40B4-BE49-F238E27FC236}">
+                <a16:creationId xmlns:a16="http://schemas.microsoft.com/office/drawing/2014/main" id="{6680AEE2-1D87-466C-B1FA-F987E1970D6E}"/>
+              </a:ext>
+            </a:extLst>
+          </p:cNvPr>
+          <p:cNvPicPr>
+            <a:picLocks noChangeAspect="1"/>
+          </p:cNvPicPr>
+          <p:nvPr/>
+        </p:nvPicPr>
+        <p:blipFill>
+          <a:blip r:embed="rId2">
+            <a:extLst>
+              <a:ext uri="{28A0092B-C50C-407E-A947-70E740481C1C}">
+                <a14:useLocalDpi xmlns:a14="http://schemas.microsoft.com/office/drawing/2010/main" val="0"/>
+              </a:ext>
+            </a:extLst>
+          </a:blip>
+          <a:stretch>
+            <a:fillRect/>
+          </a:stretch>
+        </p:blipFill>
+        <p:spPr>
+          <a:xfrm>
+            <a:off x="2086947" y="2553475"/>
+            <a:ext cx="379445" cy="379445"/>
+          </a:xfrm>
+          <a:prstGeom prst="rect">
+            <a:avLst/>
+          </a:prstGeom>
+        </p:spPr>
+      </p:pic>
+    </p:spTree>
+    <p:extLst>
+      <p:ext uri="{BB962C8B-B14F-4D97-AF65-F5344CB8AC3E}">
+        <p14:creationId xmlns:p14="http://schemas.microsoft.com/office/powerpoint/2010/main" val="3079407847"/>
+      </p:ext>
+    </p:extLst>
+  </p:cSld>
+  <p:clrMapOvr>
+    <a:masterClrMapping/>
+  </p:clrMapOvr>
+</p:sld>
+</file>
+
+<file path=ppt/slides/slide3.xml><?xml version="1.0" encoding="utf-8"?>
+<p:sld xmlns:a="http://schemas.openxmlformats.org/drawingml/2006/main" xmlns:r="http://schemas.openxmlformats.org/officeDocument/2006/relationships" xmlns:p="http://schemas.openxmlformats.org/presentationml/2006/main">
+  <p:cSld>
+    <p:spTree>
+      <p:nvGrpSpPr>
+        <p:cNvPr id="1" name=""/>
+        <p:cNvGrpSpPr/>
+        <p:nvPr/>
+      </p:nvGrpSpPr>
+      <p:grpSpPr>
+        <a:xfrm>
+          <a:off x="0" y="0"/>
+          <a:ext cx="0" cy="0"/>
+          <a:chOff x="0" y="0"/>
+          <a:chExt cx="0" cy="0"/>
+        </a:xfrm>
+      </p:grpSpPr>
+      <p:sp>
+        <p:nvSpPr>
+          <p:cNvPr id="4" name="Rechteck: abgerundete Ecken 3">
+            <a:extLst>
+              <a:ext uri="{FF2B5EF4-FFF2-40B4-BE49-F238E27FC236}">
+                <a16:creationId xmlns:a16="http://schemas.microsoft.com/office/drawing/2014/main" id="{70A33295-6C42-4B12-8F84-AA1EE3C07061}"/>
+              </a:ext>
+            </a:extLst>
+          </p:cNvPr>
+          <p:cNvSpPr/>
+          <p:nvPr/>
+        </p:nvSpPr>
+        <p:spPr>
+          <a:xfrm>
+            <a:off x="1779038" y="1094792"/>
+            <a:ext cx="1704391" cy="634481"/>
+          </a:xfrm>
+          <a:prstGeom prst="roundRect">
+            <a:avLst/>
+          </a:prstGeom>
+        </p:spPr>
+        <p:style>
+          <a:lnRef idx="1">
+            <a:schemeClr val="dk1"/>
+          </a:lnRef>
+          <a:fillRef idx="2">
+            <a:schemeClr val="dk1"/>
+          </a:fillRef>
+          <a:effectRef idx="1">
+            <a:schemeClr val="dk1"/>
+          </a:effectRef>
+          <a:fontRef idx="minor">
+            <a:schemeClr val="dk1"/>
+          </a:fontRef>
+        </p:style>
+        <p:txBody>
+          <a:bodyPr rtlCol="0" anchor="ctr"/>
+          <a:lstStyle/>
+          <a:p>
+            <a:pPr algn="ctr"/>
+            <a:r>
+              <a:rPr lang="de-DE" dirty="0"/>
+              <a:t>Bob-1</a:t>
+            </a:r>
+          </a:p>
+        </p:txBody>
+      </p:sp>
+      <p:sp>
+        <p:nvSpPr>
+          <p:cNvPr id="5" name="Rechteck: abgerundete Ecken 4">
+            <a:extLst>
+              <a:ext uri="{FF2B5EF4-FFF2-40B4-BE49-F238E27FC236}">
+                <a16:creationId xmlns:a16="http://schemas.microsoft.com/office/drawing/2014/main" id="{626A39C0-305C-409F-AB6B-543F77177F21}"/>
+              </a:ext>
+            </a:extLst>
+          </p:cNvPr>
+          <p:cNvSpPr/>
+          <p:nvPr/>
+        </p:nvSpPr>
+        <p:spPr>
+          <a:xfrm>
+            <a:off x="4578220" y="1094791"/>
+            <a:ext cx="1704391" cy="634481"/>
+          </a:xfrm>
+          <a:prstGeom prst="roundRect">
+            <a:avLst/>
+          </a:prstGeom>
+        </p:spPr>
+        <p:style>
+          <a:lnRef idx="1">
+            <a:schemeClr val="dk1"/>
+          </a:lnRef>
+          <a:fillRef idx="2">
+            <a:schemeClr val="dk1"/>
+          </a:fillRef>
+          <a:effectRef idx="1">
+            <a:schemeClr val="dk1"/>
+          </a:effectRef>
+          <a:fontRef idx="minor">
+            <a:schemeClr val="dk1"/>
+          </a:fontRef>
+        </p:style>
+        <p:txBody>
+          <a:bodyPr rtlCol="0" anchor="ctr"/>
+          <a:lstStyle/>
+          <a:p>
+            <a:pPr algn="ctr"/>
+            <a:r>
+              <a:rPr lang="de-DE" dirty="0"/>
+              <a:t>Bob-2</a:t>
+            </a:r>
+          </a:p>
+        </p:txBody>
+      </p:sp>
+      <p:sp>
+        <p:nvSpPr>
+          <p:cNvPr id="6" name="Rechteck: abgerundete Ecken 5">
+            <a:extLst>
+              <a:ext uri="{FF2B5EF4-FFF2-40B4-BE49-F238E27FC236}">
+                <a16:creationId xmlns:a16="http://schemas.microsoft.com/office/drawing/2014/main" id="{2E1A1E50-A6A5-437D-9C65-F6208915DCF7}"/>
+              </a:ext>
+            </a:extLst>
+          </p:cNvPr>
+          <p:cNvSpPr/>
+          <p:nvPr/>
+        </p:nvSpPr>
+        <p:spPr>
+          <a:xfrm>
+            <a:off x="3483429" y="3115647"/>
+            <a:ext cx="1094791" cy="626706"/>
+          </a:xfrm>
+          <a:prstGeom prst="roundRect">
+            <a:avLst/>
+          </a:prstGeom>
+        </p:spPr>
+        <p:style>
+          <a:lnRef idx="1">
+            <a:schemeClr val="accent3"/>
+          </a:lnRef>
+          <a:fillRef idx="2">
+            <a:schemeClr val="accent3"/>
+          </a:fillRef>
+          <a:effectRef idx="1">
+            <a:schemeClr val="accent3"/>
+          </a:effectRef>
+          <a:fontRef idx="minor">
+            <a:schemeClr val="dk1"/>
+          </a:fontRef>
+        </p:style>
+        <p:txBody>
+          <a:bodyPr rtlCol="0" anchor="ctr"/>
+          <a:lstStyle/>
+          <a:p>
+            <a:pPr algn="ctr"/>
+            <a:r>
+              <a:rPr lang="de-DE" dirty="0"/>
+              <a:t>Alice</a:t>
+            </a:r>
+          </a:p>
+        </p:txBody>
+      </p:sp>
+      <p:sp>
+        <p:nvSpPr>
+          <p:cNvPr id="7" name="Rechteck 6">
+            <a:extLst>
+              <a:ext uri="{FF2B5EF4-FFF2-40B4-BE49-F238E27FC236}">
+                <a16:creationId xmlns:a16="http://schemas.microsoft.com/office/drawing/2014/main" id="{EAB340F1-4E8E-4C30-9842-D369BA6F7B8D}"/>
+              </a:ext>
+            </a:extLst>
+          </p:cNvPr>
+          <p:cNvSpPr/>
+          <p:nvPr/>
+        </p:nvSpPr>
+        <p:spPr>
+          <a:xfrm>
+            <a:off x="2086947" y="1729273"/>
+            <a:ext cx="1088571" cy="379444"/>
+          </a:xfrm>
+          <a:prstGeom prst="rect">
+            <a:avLst/>
+          </a:prstGeom>
+          <a:solidFill>
+            <a:schemeClr val="bg2">
+              <a:lumMod val="75000"/>
+            </a:schemeClr>
+          </a:solidFill>
+          <a:ln>
+            <a:solidFill>
+              <a:schemeClr val="tx1"/>
+            </a:solidFill>
+          </a:ln>
+        </p:spPr>
+        <p:style>
+          <a:lnRef idx="2">
+            <a:schemeClr val="accent1">
+              <a:shade val="50000"/>
+            </a:schemeClr>
+          </a:lnRef>
+          <a:fillRef idx="1">
+            <a:schemeClr val="accent1"/>
+          </a:fillRef>
+          <a:effectRef idx="0">
+            <a:schemeClr val="accent1"/>
+          </a:effectRef>
+          <a:fontRef idx="minor">
+            <a:schemeClr val="lt1"/>
+          </a:fontRef>
+        </p:style>
+        <p:txBody>
+          <a:bodyPr rtlCol="0" anchor="ctr"/>
+          <a:lstStyle/>
+          <a:p>
+            <a:pPr algn="ctr"/>
+            <a:r>
+              <a:rPr lang="de-DE" dirty="0"/>
+              <a:t>Login</a:t>
+            </a:r>
+          </a:p>
+        </p:txBody>
+      </p:sp>
+      <p:cxnSp>
+        <p:nvCxnSpPr>
+          <p:cNvPr id="3" name="Gerade Verbindung mit Pfeil 2">
+            <a:extLst>
+              <a:ext uri="{FF2B5EF4-FFF2-40B4-BE49-F238E27FC236}">
+                <a16:creationId xmlns:a16="http://schemas.microsoft.com/office/drawing/2014/main" id="{8604AAEA-F06F-4A71-9F7D-D2C1602749DE}"/>
+              </a:ext>
+            </a:extLst>
+          </p:cNvPr>
+          <p:cNvCxnSpPr/>
+          <p:nvPr/>
+        </p:nvCxnSpPr>
+        <p:spPr>
+          <a:xfrm>
+            <a:off x="3483429" y="1268963"/>
+            <a:ext cx="1094791" cy="0"/>
+          </a:xfrm>
+          <a:prstGeom prst="straightConnector1">
+            <a:avLst/>
+          </a:prstGeom>
+          <a:ln>
+            <a:tailEnd type="triangle"/>
+          </a:ln>
+        </p:spPr>
+        <p:style>
+          <a:lnRef idx="1">
+            <a:schemeClr val="dk1"/>
+          </a:lnRef>
+          <a:fillRef idx="0">
+            <a:schemeClr val="dk1"/>
+          </a:fillRef>
+          <a:effectRef idx="0">
+            <a:schemeClr val="dk1"/>
+          </a:effectRef>
+          <a:fontRef idx="minor">
+            <a:schemeClr val="tx1"/>
+          </a:fontRef>
+        </p:style>
+      </p:cxnSp>
+      <p:sp>
+        <p:nvSpPr>
+          <p:cNvPr id="8" name="Textfeld 7">
+            <a:extLst>
+              <a:ext uri="{FF2B5EF4-FFF2-40B4-BE49-F238E27FC236}">
+                <a16:creationId xmlns:a16="http://schemas.microsoft.com/office/drawing/2014/main" id="{B112D684-0148-46D3-A496-136CD5978698}"/>
+              </a:ext>
+            </a:extLst>
+          </p:cNvPr>
+          <p:cNvSpPr txBox="1"/>
+          <p:nvPr/>
+        </p:nvSpPr>
+        <p:spPr>
+          <a:xfrm>
+            <a:off x="3595396" y="1094791"/>
+            <a:ext cx="926841" cy="246221"/>
+          </a:xfrm>
+          <a:prstGeom prst="rect">
+            <a:avLst/>
+          </a:prstGeom>
+          <a:noFill/>
+        </p:spPr>
+        <p:txBody>
+          <a:bodyPr wrap="square" rtlCol="0">
+            <a:spAutoFit/>
+          </a:bodyPr>
+          <a:lstStyle/>
+          <a:p>
+            <a:r>
+              <a:rPr lang="de-DE" sz="1000" dirty="0"/>
+              <a:t>Commitment</a:t>
+            </a:r>
+          </a:p>
+        </p:txBody>
+      </p:sp>
+      <p:cxnSp>
+        <p:nvCxnSpPr>
+          <p:cNvPr id="10" name="Gerade Verbindung mit Pfeil 9">
+            <a:extLst>
+              <a:ext uri="{FF2B5EF4-FFF2-40B4-BE49-F238E27FC236}">
+                <a16:creationId xmlns:a16="http://schemas.microsoft.com/office/drawing/2014/main" id="{7414DE4C-5A97-4B97-9C28-4DDFE5128625}"/>
+              </a:ext>
+            </a:extLst>
+          </p:cNvPr>
+          <p:cNvCxnSpPr/>
+          <p:nvPr/>
+        </p:nvCxnSpPr>
+        <p:spPr>
+          <a:xfrm>
+            <a:off x="3483429" y="1524514"/>
+            <a:ext cx="1094791" cy="0"/>
+          </a:xfrm>
+          <a:prstGeom prst="straightConnector1">
+            <a:avLst/>
+          </a:prstGeom>
+          <a:ln>
+            <a:tailEnd type="triangle"/>
+          </a:ln>
+        </p:spPr>
+        <p:style>
+          <a:lnRef idx="1">
+            <a:schemeClr val="dk1"/>
+          </a:lnRef>
+          <a:fillRef idx="0">
+            <a:schemeClr val="dk1"/>
+          </a:fillRef>
+          <a:effectRef idx="0">
+            <a:schemeClr val="dk1"/>
+          </a:effectRef>
+          <a:fontRef idx="minor">
+            <a:schemeClr val="tx1"/>
+          </a:fontRef>
+        </p:style>
+      </p:cxnSp>
+      <p:sp>
+        <p:nvSpPr>
+          <p:cNvPr id="11" name="Textfeld 10">
+            <a:extLst>
+              <a:ext uri="{FF2B5EF4-FFF2-40B4-BE49-F238E27FC236}">
+                <a16:creationId xmlns:a16="http://schemas.microsoft.com/office/drawing/2014/main" id="{9C3B8AA0-940E-4E25-905E-76E1FC960D8F}"/>
+              </a:ext>
+            </a:extLst>
+          </p:cNvPr>
+          <p:cNvSpPr txBox="1"/>
+          <p:nvPr/>
+        </p:nvSpPr>
+        <p:spPr>
+          <a:xfrm>
+            <a:off x="3651379" y="1341012"/>
+            <a:ext cx="926841" cy="246221"/>
+          </a:xfrm>
+          <a:prstGeom prst="rect">
+            <a:avLst/>
+          </a:prstGeom>
+          <a:noFill/>
+        </p:spPr>
+        <p:txBody>
+          <a:bodyPr wrap="square" rtlCol="0">
+            <a:spAutoFit/>
+          </a:bodyPr>
+          <a:lstStyle/>
+          <a:p>
+            <a:r>
+              <a:rPr lang="de-DE" sz="1000" dirty="0"/>
+              <a:t>User-Rights</a:t>
+            </a:r>
+          </a:p>
+        </p:txBody>
+      </p:sp>
+      <p:pic>
+        <p:nvPicPr>
+          <p:cNvPr id="12" name="Grafik 11">
+            <a:extLst>
+              <a:ext uri="{FF2B5EF4-FFF2-40B4-BE49-F238E27FC236}">
+                <a16:creationId xmlns:a16="http://schemas.microsoft.com/office/drawing/2014/main" id="{1814EE49-A6FD-482B-AA0C-B4096A00A5B8}"/>
+              </a:ext>
+            </a:extLst>
+          </p:cNvPr>
+          <p:cNvPicPr>
+            <a:picLocks noChangeAspect="1"/>
+          </p:cNvPicPr>
+          <p:nvPr/>
+        </p:nvPicPr>
+        <p:blipFill>
+          <a:blip r:embed="rId2">
+            <a:extLst>
+              <a:ext uri="{28A0092B-C50C-407E-A947-70E740481C1C}">
+                <a14:useLocalDpi xmlns:a14="http://schemas.microsoft.com/office/drawing/2010/main" val="0"/>
+              </a:ext>
+            </a:extLst>
+          </a:blip>
+          <a:stretch>
+            <a:fillRect/>
+          </a:stretch>
+        </p:blipFill>
+        <p:spPr>
+          <a:xfrm>
+            <a:off x="3841102" y="791548"/>
+            <a:ext cx="379445" cy="379445"/>
+          </a:xfrm>
+          <a:prstGeom prst="rect">
+            <a:avLst/>
+          </a:prstGeom>
+        </p:spPr>
+      </p:pic>
+    </p:spTree>
+    <p:extLst>
+      <p:ext uri="{BB962C8B-B14F-4D97-AF65-F5344CB8AC3E}">
+        <p14:creationId xmlns:p14="http://schemas.microsoft.com/office/powerpoint/2010/main" val="3266680871"/>
+      </p:ext>
+    </p:extLst>
+  </p:cSld>
+  <p:clrMapOvr>
+    <a:masterClrMapping/>
+  </p:clrMapOvr>
+</p:sld>
+</file>
+
+<file path=ppt/slides/slide4.xml><?xml version="1.0" encoding="utf-8"?>
+<p:sld xmlns:a="http://schemas.openxmlformats.org/drawingml/2006/main" xmlns:r="http://schemas.openxmlformats.org/officeDocument/2006/relationships" xmlns:p="http://schemas.openxmlformats.org/presentationml/2006/main">
+  <p:cSld>
+    <p:spTree>
+      <p:nvGrpSpPr>
+        <p:cNvPr id="1" name=""/>
+        <p:cNvGrpSpPr/>
+        <p:nvPr/>
+      </p:nvGrpSpPr>
+      <p:grpSpPr>
+        <a:xfrm>
+          <a:off x="0" y="0"/>
+          <a:ext cx="0" cy="0"/>
+          <a:chOff x="0" y="0"/>
+          <a:chExt cx="0" cy="0"/>
+        </a:xfrm>
+      </p:grpSpPr>
+      <p:sp>
+        <p:nvSpPr>
+          <p:cNvPr id="4" name="Rechteck: abgerundete Ecken 3">
+            <a:extLst>
+              <a:ext uri="{FF2B5EF4-FFF2-40B4-BE49-F238E27FC236}">
+                <a16:creationId xmlns:a16="http://schemas.microsoft.com/office/drawing/2014/main" id="{70A33295-6C42-4B12-8F84-AA1EE3C07061}"/>
+              </a:ext>
+            </a:extLst>
+          </p:cNvPr>
+          <p:cNvSpPr/>
+          <p:nvPr/>
+        </p:nvSpPr>
+        <p:spPr>
+          <a:xfrm>
+            <a:off x="1779038" y="1094792"/>
+            <a:ext cx="1704391" cy="634481"/>
+          </a:xfrm>
+          <a:prstGeom prst="roundRect">
+            <a:avLst/>
+          </a:prstGeom>
+        </p:spPr>
+        <p:style>
+          <a:lnRef idx="1">
+            <a:schemeClr val="dk1"/>
+          </a:lnRef>
+          <a:fillRef idx="2">
+            <a:schemeClr val="dk1"/>
+          </a:fillRef>
+          <a:effectRef idx="1">
+            <a:schemeClr val="dk1"/>
+          </a:effectRef>
+          <a:fontRef idx="minor">
+            <a:schemeClr val="dk1"/>
+          </a:fontRef>
+        </p:style>
+        <p:txBody>
+          <a:bodyPr rtlCol="0" anchor="ctr"/>
+          <a:lstStyle/>
+          <a:p>
+            <a:pPr algn="ctr"/>
+            <a:r>
+              <a:rPr lang="de-DE" dirty="0"/>
+              <a:t>Bob-1</a:t>
+            </a:r>
+          </a:p>
+        </p:txBody>
+      </p:sp>
+      <p:sp>
+        <p:nvSpPr>
+          <p:cNvPr id="5" name="Rechteck: abgerundete Ecken 4">
+            <a:extLst>
+              <a:ext uri="{FF2B5EF4-FFF2-40B4-BE49-F238E27FC236}">
+                <a16:creationId xmlns:a16="http://schemas.microsoft.com/office/drawing/2014/main" id="{626A39C0-305C-409F-AB6B-543F77177F21}"/>
+              </a:ext>
+            </a:extLst>
+          </p:cNvPr>
+          <p:cNvSpPr/>
+          <p:nvPr/>
+        </p:nvSpPr>
+        <p:spPr>
+          <a:xfrm>
+            <a:off x="4578220" y="1094791"/>
+            <a:ext cx="1704391" cy="634481"/>
+          </a:xfrm>
+          <a:prstGeom prst="roundRect">
+            <a:avLst/>
+          </a:prstGeom>
+        </p:spPr>
+        <p:style>
+          <a:lnRef idx="1">
+            <a:schemeClr val="dk1"/>
+          </a:lnRef>
+          <a:fillRef idx="2">
+            <a:schemeClr val="dk1"/>
+          </a:fillRef>
+          <a:effectRef idx="1">
+            <a:schemeClr val="dk1"/>
+          </a:effectRef>
+          <a:fontRef idx="minor">
+            <a:schemeClr val="dk1"/>
+          </a:fontRef>
+        </p:style>
+        <p:txBody>
+          <a:bodyPr rtlCol="0" anchor="ctr"/>
+          <a:lstStyle/>
+          <a:p>
+            <a:pPr algn="ctr"/>
+            <a:r>
+              <a:rPr lang="de-DE" dirty="0"/>
+              <a:t>Bob-2</a:t>
+            </a:r>
+          </a:p>
+        </p:txBody>
+      </p:sp>
+      <p:sp>
+        <p:nvSpPr>
+          <p:cNvPr id="6" name="Rechteck: abgerundete Ecken 5">
+            <a:extLst>
+              <a:ext uri="{FF2B5EF4-FFF2-40B4-BE49-F238E27FC236}">
+                <a16:creationId xmlns:a16="http://schemas.microsoft.com/office/drawing/2014/main" id="{2E1A1E50-A6A5-437D-9C65-F6208915DCF7}"/>
+              </a:ext>
+            </a:extLst>
+          </p:cNvPr>
+          <p:cNvSpPr/>
+          <p:nvPr/>
+        </p:nvSpPr>
+        <p:spPr>
+          <a:xfrm>
+            <a:off x="3483429" y="3115647"/>
+            <a:ext cx="1094791" cy="626706"/>
+          </a:xfrm>
+          <a:prstGeom prst="roundRect">
+            <a:avLst/>
+          </a:prstGeom>
+        </p:spPr>
+        <p:style>
+          <a:lnRef idx="1">
+            <a:schemeClr val="accent3"/>
+          </a:lnRef>
+          <a:fillRef idx="2">
+            <a:schemeClr val="accent3"/>
+          </a:fillRef>
+          <a:effectRef idx="1">
+            <a:schemeClr val="accent3"/>
+          </a:effectRef>
+          <a:fontRef idx="minor">
+            <a:schemeClr val="dk1"/>
+          </a:fontRef>
+        </p:style>
+        <p:txBody>
+          <a:bodyPr rtlCol="0" anchor="ctr"/>
+          <a:lstStyle/>
+          <a:p>
+            <a:pPr algn="ctr"/>
+            <a:r>
+              <a:rPr lang="de-DE" dirty="0"/>
+              <a:t>Alice</a:t>
+            </a:r>
+          </a:p>
+        </p:txBody>
+      </p:sp>
+      <p:sp>
+        <p:nvSpPr>
+          <p:cNvPr id="7" name="Rechteck 6">
+            <a:extLst>
+              <a:ext uri="{FF2B5EF4-FFF2-40B4-BE49-F238E27FC236}">
+                <a16:creationId xmlns:a16="http://schemas.microsoft.com/office/drawing/2014/main" id="{EAB340F1-4E8E-4C30-9842-D369BA6F7B8D}"/>
+              </a:ext>
+            </a:extLst>
+          </p:cNvPr>
+          <p:cNvSpPr/>
+          <p:nvPr/>
+        </p:nvSpPr>
+        <p:spPr>
+          <a:xfrm>
+            <a:off x="2086947" y="1729273"/>
+            <a:ext cx="1088571" cy="379444"/>
+          </a:xfrm>
+          <a:prstGeom prst="rect">
+            <a:avLst/>
+          </a:prstGeom>
+          <a:solidFill>
+            <a:schemeClr val="bg2">
+              <a:lumMod val="75000"/>
+            </a:schemeClr>
+          </a:solidFill>
+          <a:ln>
+            <a:solidFill>
+              <a:schemeClr val="tx1"/>
+            </a:solidFill>
+          </a:ln>
+        </p:spPr>
+        <p:style>
+          <a:lnRef idx="2">
+            <a:schemeClr val="accent1">
+              <a:shade val="50000"/>
+            </a:schemeClr>
+          </a:lnRef>
+          <a:fillRef idx="1">
+            <a:schemeClr val="accent1"/>
+          </a:fillRef>
+          <a:effectRef idx="0">
+            <a:schemeClr val="accent1"/>
+          </a:effectRef>
+          <a:fontRef idx="minor">
+            <a:schemeClr val="lt1"/>
+          </a:fontRef>
+        </p:style>
+        <p:txBody>
+          <a:bodyPr rtlCol="0" anchor="ctr"/>
+          <a:lstStyle/>
+          <a:p>
+            <a:pPr algn="ctr"/>
+            <a:r>
+              <a:rPr lang="de-DE" dirty="0"/>
+              <a:t>Login</a:t>
+            </a:r>
+          </a:p>
+        </p:txBody>
+      </p:sp>
+      <p:cxnSp>
+        <p:nvCxnSpPr>
+          <p:cNvPr id="9" name="Verbinder: gewinkelt 8">
+            <a:extLst>
+              <a:ext uri="{FF2B5EF4-FFF2-40B4-BE49-F238E27FC236}">
+                <a16:creationId xmlns:a16="http://schemas.microsoft.com/office/drawing/2014/main" id="{6C57963A-2A70-4D84-BEDB-DE4E12320A48}"/>
+              </a:ext>
+            </a:extLst>
+          </p:cNvPr>
+          <p:cNvCxnSpPr>
+            <a:cxnSpLocks/>
+          </p:cNvCxnSpPr>
+          <p:nvPr/>
+        </p:nvCxnSpPr>
+        <p:spPr>
+          <a:xfrm rot="5400000" flipH="1" flipV="1">
+            <a:off x="4161452" y="2146041"/>
+            <a:ext cx="1542663" cy="709127"/>
+          </a:xfrm>
+          <a:prstGeom prst="bentConnector3">
+            <a:avLst>
+              <a:gd name="adj1" fmla="val 0"/>
+            </a:avLst>
+          </a:prstGeom>
+          <a:ln>
+            <a:tailEnd type="triangle"/>
+          </a:ln>
+        </p:spPr>
+        <p:style>
+          <a:lnRef idx="1">
+            <a:schemeClr val="dk1"/>
+          </a:lnRef>
+          <a:fillRef idx="0">
+            <a:schemeClr val="dk1"/>
+          </a:fillRef>
+          <a:effectRef idx="0">
+            <a:schemeClr val="dk1"/>
+          </a:effectRef>
+          <a:fontRef idx="minor">
+            <a:schemeClr val="tx1"/>
+          </a:fontRef>
+        </p:style>
+      </p:cxnSp>
+      <p:sp>
+        <p:nvSpPr>
+          <p:cNvPr id="12" name="Textfeld 11">
+            <a:extLst>
+              <a:ext uri="{FF2B5EF4-FFF2-40B4-BE49-F238E27FC236}">
+                <a16:creationId xmlns:a16="http://schemas.microsoft.com/office/drawing/2014/main" id="{B1E0ACF6-91DA-4AA1-9AED-DF1789218066}"/>
+              </a:ext>
+            </a:extLst>
+          </p:cNvPr>
+          <p:cNvSpPr txBox="1"/>
+          <p:nvPr/>
+        </p:nvSpPr>
+        <p:spPr>
+          <a:xfrm>
+            <a:off x="4410852" y="2346350"/>
+            <a:ext cx="976604" cy="430887"/>
+          </a:xfrm>
+          <a:prstGeom prst="rect">
+            <a:avLst/>
+          </a:prstGeom>
+          <a:noFill/>
+        </p:spPr>
+        <p:txBody>
+          <a:bodyPr wrap="square" rtlCol="0">
+            <a:spAutoFit/>
+          </a:bodyPr>
+          <a:lstStyle/>
+          <a:p>
+            <a:r>
+              <a:rPr lang="de-DE" sz="1100" dirty="0"/>
+              <a:t>Revealing Commitment</a:t>
+            </a:r>
+            <a:endParaRPr lang="de-DE" dirty="0"/>
+          </a:p>
+        </p:txBody>
+      </p:sp>
+      <p:cxnSp>
+        <p:nvCxnSpPr>
+          <p:cNvPr id="10" name="Verbinder: gewinkelt 9">
+            <a:extLst>
+              <a:ext uri="{FF2B5EF4-FFF2-40B4-BE49-F238E27FC236}">
+                <a16:creationId xmlns:a16="http://schemas.microsoft.com/office/drawing/2014/main" id="{418B366B-8339-4CDE-BAA7-718B240F3AD0}"/>
+              </a:ext>
+            </a:extLst>
+          </p:cNvPr>
+          <p:cNvCxnSpPr/>
+          <p:nvPr/>
+        </p:nvCxnSpPr>
+        <p:spPr>
+          <a:xfrm rot="5400000">
+            <a:off x="4211216" y="2096277"/>
+            <a:ext cx="1872344" cy="1138335"/>
+          </a:xfrm>
+          <a:prstGeom prst="bentConnector3">
+            <a:avLst>
+              <a:gd name="adj1" fmla="val 99834"/>
+            </a:avLst>
+          </a:prstGeom>
+          <a:ln>
+            <a:solidFill>
+              <a:schemeClr val="tx1"/>
+            </a:solidFill>
+            <a:tailEnd type="triangle"/>
+          </a:ln>
+        </p:spPr>
+        <p:style>
+          <a:lnRef idx="1">
+            <a:schemeClr val="accent1"/>
+          </a:lnRef>
+          <a:fillRef idx="0">
+            <a:schemeClr val="accent1"/>
+          </a:fillRef>
+          <a:effectRef idx="0">
+            <a:schemeClr val="accent1"/>
+          </a:effectRef>
+          <a:fontRef idx="minor">
+            <a:schemeClr val="tx1"/>
+          </a:fontRef>
+        </p:style>
+      </p:cxnSp>
+      <p:sp>
+        <p:nvSpPr>
+          <p:cNvPr id="13" name="Textfeld 12">
+            <a:extLst>
+              <a:ext uri="{FF2B5EF4-FFF2-40B4-BE49-F238E27FC236}">
+                <a16:creationId xmlns:a16="http://schemas.microsoft.com/office/drawing/2014/main" id="{251FF140-BF2C-4EEF-A8AA-D659A1F4F13F}"/>
+              </a:ext>
+            </a:extLst>
+          </p:cNvPr>
+          <p:cNvSpPr txBox="1"/>
+          <p:nvPr/>
+        </p:nvSpPr>
+        <p:spPr>
+          <a:xfrm>
+            <a:off x="5716556" y="2309263"/>
+            <a:ext cx="1244081" cy="430887"/>
+          </a:xfrm>
+          <a:prstGeom prst="rect">
+            <a:avLst/>
+          </a:prstGeom>
+          <a:noFill/>
+        </p:spPr>
+        <p:txBody>
+          <a:bodyPr wrap="square" rtlCol="0">
+            <a:spAutoFit/>
+          </a:bodyPr>
+          <a:lstStyle/>
+          <a:p>
+            <a:r>
+              <a:rPr lang="de-DE" sz="1100" dirty="0"/>
+              <a:t>Granting privileges</a:t>
+            </a:r>
+            <a:endParaRPr lang="de-DE" dirty="0"/>
+          </a:p>
+        </p:txBody>
+      </p:sp>
+      <p:pic>
+        <p:nvPicPr>
+          <p:cNvPr id="15" name="Grafik 14">
+            <a:extLst>
+              <a:ext uri="{FF2B5EF4-FFF2-40B4-BE49-F238E27FC236}">
+                <a16:creationId xmlns:a16="http://schemas.microsoft.com/office/drawing/2014/main" id="{CD30A691-AD85-4E6E-AD07-995407A981EE}"/>
+              </a:ext>
+            </a:extLst>
+          </p:cNvPr>
+          <p:cNvPicPr>
+            <a:picLocks noChangeAspect="1"/>
+          </p:cNvPicPr>
+          <p:nvPr/>
+        </p:nvPicPr>
+        <p:blipFill>
+          <a:blip r:embed="rId2">
+            <a:extLst>
+              <a:ext uri="{28A0092B-C50C-407E-A947-70E740481C1C}">
+                <a14:useLocalDpi xmlns:a14="http://schemas.microsoft.com/office/drawing/2010/main" val="0"/>
+              </a:ext>
+            </a:extLst>
+          </a:blip>
+          <a:stretch>
+            <a:fillRect/>
+          </a:stretch>
+        </p:blipFill>
+        <p:spPr>
+          <a:xfrm>
+            <a:off x="3922550" y="2258659"/>
+            <a:ext cx="809236" cy="606268"/>
+          </a:xfrm>
+          <a:prstGeom prst="rect">
+            <a:avLst/>
+          </a:prstGeom>
+        </p:spPr>
+      </p:pic>
+    </p:spTree>
+    <p:extLst>
+      <p:ext uri="{BB962C8B-B14F-4D97-AF65-F5344CB8AC3E}">
+        <p14:creationId xmlns:p14="http://schemas.microsoft.com/office/powerpoint/2010/main" val="2416883210"/>
+      </p:ext>
+    </p:extLst>
+  </p:cSld>
+  <p:clrMapOvr>
+    <a:masterClrMapping/>
+  </p:clrMapOvr>
+</p:sld>
+</file>
+
 <file path=ppt/theme/theme1.xml><?xml version="1.0" encoding="utf-8"?>
 <a:theme xmlns:a="http://schemas.openxmlformats.org/drawingml/2006/main" name="Office">
   <a:themeElements>

</xml_diff>